<commit_message>
add pptx for d2
</commit_message>
<xml_diff>
--- a/Fall_2024/day2/D_Echarts4r_r-markdown_flexdashboard.pptx
+++ b/Fall_2024/day2/D_Echarts4r_r-markdown_flexdashboard.pptx
@@ -5173,7 +5173,10 @@
               <a:rPr lang="en-US" dirty="0" err="1"/>
               <a:t>Vizuals</a:t>
             </a:r>
-            <a:endParaRPr lang="en-US" dirty="0"/>
+            <a:r>
+              <a:rPr lang="en-US" dirty="0"/>
+              <a:t> –G_ggplot_echarts4r.R</a:t>
+            </a:r>
           </a:p>
         </p:txBody>
       </p:sp>

</xml_diff>